<commit_message>
added some visualizations  for analysis and understanding
</commit_message>
<xml_diff>
--- a/presentation/presentation.pptx
+++ b/presentation/presentation.pptx
@@ -4064,10 +4064,10 @@
       </p:grpSpPr>
       <p:pic>
         <p:nvPicPr>
-          <p:cNvPr id="3" name="Picture 2">
-            <a:extLst>
-              <a:ext uri="{FF2B5EF4-FFF2-40B4-BE49-F238E27FC236}">
-                <a16:creationId xmlns:a16="http://schemas.microsoft.com/office/drawing/2014/main" id="{5B2A7E82-224E-4961-5133-CE8E5B6ABFAC}"/>
+          <p:cNvPr id="4" name="Picture 3">
+            <a:extLst>
+              <a:ext uri="{FF2B5EF4-FFF2-40B4-BE49-F238E27FC236}">
+                <a16:creationId xmlns:a16="http://schemas.microsoft.com/office/drawing/2014/main" id="{D9D49E29-24AD-38EB-F872-07487C5089BC}"/>
               </a:ext>
             </a:extLst>
           </p:cNvPr>
@@ -4077,15 +4077,21 @@
           <p:nvPr/>
         </p:nvPicPr>
         <p:blipFill>
-          <a:blip r:embed="rId2"/>
+          <a:blip r:embed="rId2">
+            <a:extLst>
+              <a:ext uri="{28A0092B-C50C-407E-A947-70E740481C1C}">
+                <a14:useLocalDpi xmlns:a14="http://schemas.microsoft.com/office/drawing/2010/main" val="0"/>
+              </a:ext>
+            </a:extLst>
+          </a:blip>
           <a:stretch>
             <a:fillRect/>
           </a:stretch>
         </p:blipFill>
         <p:spPr>
           <a:xfrm>
-            <a:off x="0" y="0"/>
-            <a:ext cx="12192000" cy="6857999"/>
+            <a:off x="429768" y="384048"/>
+            <a:ext cx="11247120" cy="6089904"/>
           </a:xfrm>
           <a:prstGeom prst="rect">
             <a:avLst/>
@@ -4124,10 +4130,10 @@
       </p:grpSpPr>
       <p:pic>
         <p:nvPicPr>
-          <p:cNvPr id="3" name="Picture 2">
-            <a:extLst>
-              <a:ext uri="{FF2B5EF4-FFF2-40B4-BE49-F238E27FC236}">
-                <a16:creationId xmlns:a16="http://schemas.microsoft.com/office/drawing/2014/main" id="{44063BB1-0F10-57F9-C5A9-EA6522BF58F5}"/>
+          <p:cNvPr id="4" name="Picture 3">
+            <a:extLst>
+              <a:ext uri="{FF2B5EF4-FFF2-40B4-BE49-F238E27FC236}">
+                <a16:creationId xmlns:a16="http://schemas.microsoft.com/office/drawing/2014/main" id="{F6D2B58D-FC06-B301-959B-908EA28E99CC}"/>
               </a:ext>
             </a:extLst>
           </p:cNvPr>
@@ -4150,8 +4156,8 @@
         </p:blipFill>
         <p:spPr>
           <a:xfrm>
-            <a:off x="0" y="0"/>
-            <a:ext cx="12192000" cy="6858000"/>
+            <a:off x="484632" y="301752"/>
+            <a:ext cx="11311128" cy="6181344"/>
           </a:xfrm>
           <a:prstGeom prst="rect">
             <a:avLst/>
@@ -4190,10 +4196,10 @@
       </p:grpSpPr>
       <p:pic>
         <p:nvPicPr>
-          <p:cNvPr id="3" name="Picture 2">
-            <a:extLst>
-              <a:ext uri="{FF2B5EF4-FFF2-40B4-BE49-F238E27FC236}">
-                <a16:creationId xmlns:a16="http://schemas.microsoft.com/office/drawing/2014/main" id="{4F0CEE1F-EB6F-6042-8067-24B25E6681D1}"/>
+          <p:cNvPr id="4" name="Picture 3">
+            <a:extLst>
+              <a:ext uri="{FF2B5EF4-FFF2-40B4-BE49-F238E27FC236}">
+                <a16:creationId xmlns:a16="http://schemas.microsoft.com/office/drawing/2014/main" id="{F1BD9BA2-512B-72FA-A230-00D63D7E2F9A}"/>
               </a:ext>
             </a:extLst>
           </p:cNvPr>
@@ -4216,8 +4222,8 @@
         </p:blipFill>
         <p:spPr>
           <a:xfrm>
-            <a:off x="0" y="0"/>
-            <a:ext cx="12192000" cy="6858000"/>
+            <a:off x="338328" y="274320"/>
+            <a:ext cx="11494008" cy="6263640"/>
           </a:xfrm>
           <a:prstGeom prst="rect">
             <a:avLst/>

</xml_diff>